<commit_message>
naive bayes pic2, pic3 upload
</commit_message>
<xml_diff>
--- a/pics/2020-08-04-naive_bayes/pics.pptx
+++ b/pics/2020-08-04-naive_bayes/pics.pptx
@@ -5,7 +5,8 @@
     <p:sldMasterId id="2147483648" r:id="rId1"/>
   </p:sldMasterIdLst>
   <p:sldIdLst>
-    <p:sldId id="256" r:id="rId2"/>
+    <p:sldId id="257" r:id="rId2"/>
+    <p:sldId id="256" r:id="rId3"/>
   </p:sldIdLst>
   <p:sldSz cx="12192000" cy="6858000"/>
   <p:notesSz cx="6858000" cy="9144000"/>
@@ -104,6 +105,11 @@
       </a:defRPr>
     </a:lvl9pPr>
   </p:defaultTextStyle>
+  <p:extLst>
+    <p:ext uri="{EFAFB233-063F-42B5-8137-9DF3F51BA10A}">
+      <p15:sldGuideLst xmlns:p15="http://schemas.microsoft.com/office/powerpoint/2012/main"/>
+    </p:ext>
+  </p:extLst>
 </p:presentation>
 </file>
 
@@ -3323,6 +3329,66 @@
       </p:grpSpPr>
       <p:pic>
         <p:nvPicPr>
+          <p:cNvPr id="14" name="그림 13">
+            <a:extLst>
+              <a:ext uri="{FF2B5EF4-FFF2-40B4-BE49-F238E27FC236}">
+                <a16:creationId xmlns:a16="http://schemas.microsoft.com/office/drawing/2014/main" id="{66563D31-B4BD-4F72-A3A9-C9B21539B624}"/>
+              </a:ext>
+            </a:extLst>
+          </p:cNvPr>
+          <p:cNvPicPr>
+            <a:picLocks noChangeAspect="1"/>
+          </p:cNvPicPr>
+          <p:nvPr/>
+        </p:nvPicPr>
+        <p:blipFill>
+          <a:blip r:embed="rId2"/>
+          <a:stretch>
+            <a:fillRect/>
+          </a:stretch>
+        </p:blipFill>
+        <p:spPr>
+          <a:xfrm>
+            <a:off x="2576659" y="800096"/>
+            <a:ext cx="7038682" cy="5257808"/>
+          </a:xfrm>
+          <a:prstGeom prst="rect">
+            <a:avLst/>
+          </a:prstGeom>
+        </p:spPr>
+      </p:pic>
+    </p:spTree>
+    <p:extLst>
+      <p:ext uri="{BB962C8B-B14F-4D97-AF65-F5344CB8AC3E}">
+        <p14:creationId xmlns:p14="http://schemas.microsoft.com/office/powerpoint/2010/main" val="2493447541"/>
+      </p:ext>
+    </p:extLst>
+  </p:cSld>
+  <p:clrMapOvr>
+    <a:masterClrMapping/>
+  </p:clrMapOvr>
+</p:sld>
+</file>
+
+<file path=ppt/slides/slide2.xml><?xml version="1.0" encoding="utf-8"?>
+<p:sld xmlns:a="http://schemas.openxmlformats.org/drawingml/2006/main" xmlns:r="http://schemas.openxmlformats.org/officeDocument/2006/relationships" xmlns:p="http://schemas.openxmlformats.org/presentationml/2006/main">
+  <p:cSld>
+    <p:spTree>
+      <p:nvGrpSpPr>
+        <p:cNvPr id="1" name=""/>
+        <p:cNvGrpSpPr/>
+        <p:nvPr/>
+      </p:nvGrpSpPr>
+      <p:grpSpPr>
+        <a:xfrm>
+          <a:off x="0" y="0"/>
+          <a:ext cx="0" cy="0"/>
+          <a:chOff x="0" y="0"/>
+          <a:chExt cx="0" cy="0"/>
+        </a:xfrm>
+      </p:grpSpPr>
+      <p:pic>
+        <p:nvPicPr>
           <p:cNvPr id="4" name="그림 3">
             <a:extLst>
               <a:ext uri="{FF2B5EF4-FFF2-40B4-BE49-F238E27FC236}">
@@ -3527,8 +3593,8 @@
           </a:fontRef>
         </p:style>
       </p:cxnSp>
-      <mc:AlternateContent xmlns:mc="http://schemas.openxmlformats.org/markup-compatibility/2006">
-        <mc:Choice xmlns:a14="http://schemas.microsoft.com/office/drawing/2010/main" Requires="a14">
+      <mc:AlternateContent xmlns:mc="http://schemas.openxmlformats.org/markup-compatibility/2006" xmlns:a14="http://schemas.microsoft.com/office/drawing/2010/main">
+        <mc:Choice Requires="a14">
           <p:sp>
             <p:nvSpPr>
               <p:cNvPr id="17" name="TextBox 16">
@@ -3557,6 +3623,7 @@
               </a:bodyPr>
               <a:lstStyle/>
               <a:p>
+                <a:pPr/>
                 <a14:m>
                   <m:oMathPara xmlns:m="http://schemas.openxmlformats.org/officeDocument/2006/math">
                     <m:oMathParaPr>
@@ -3583,7 +3650,7 @@
             </p:txBody>
           </p:sp>
         </mc:Choice>
-        <mc:Fallback>
+        <mc:Fallback xmlns="">
           <p:sp>
             <p:nvSpPr>
               <p:cNvPr id="17" name="TextBox 16">
@@ -3722,8 +3789,8 @@
           </a:fontRef>
         </p:style>
       </p:cxnSp>
-      <mc:AlternateContent xmlns:mc="http://schemas.openxmlformats.org/markup-compatibility/2006">
-        <mc:Choice xmlns:a14="http://schemas.microsoft.com/office/drawing/2010/main" Requires="a14">
+      <mc:AlternateContent xmlns:mc="http://schemas.openxmlformats.org/markup-compatibility/2006" xmlns:a14="http://schemas.microsoft.com/office/drawing/2010/main">
+        <mc:Choice Requires="a14">
           <p:sp>
             <p:nvSpPr>
               <p:cNvPr id="21" name="TextBox 20">
@@ -3787,13 +3854,7 @@
                           <a:rPr lang="en-US" altLang="ko-KR" b="0" i="1" smtClean="0">
                             <a:latin typeface="Cambria Math" panose="02040503050406030204" pitchFamily="18" charset="0"/>
                           </a:rPr>
-                          <m:t>=</m:t>
-                        </m:r>
-                        <m:r>
-                          <a:rPr lang="en-US" altLang="ko-KR" b="0" i="1" smtClean="0">
-                            <a:latin typeface="Cambria Math" panose="02040503050406030204" pitchFamily="18" charset="0"/>
-                          </a:rPr>
-                          <m:t>175</m:t>
+                          <m:t>=175</m:t>
                         </m:r>
                         <m:r>
                           <a:rPr lang="en-US" altLang="ko-KR" b="0" i="1" smtClean="0">
@@ -3836,7 +3897,7 @@
             </p:txBody>
           </p:sp>
         </mc:Choice>
-        <mc:Fallback>
+        <mc:Fallback xmlns="">
           <p:sp>
             <p:nvSpPr>
               <p:cNvPr id="21" name="TextBox 20">
@@ -3886,8 +3947,8 @@
           </p:sp>
         </mc:Fallback>
       </mc:AlternateContent>
-      <mc:AlternateContent xmlns:mc="http://schemas.openxmlformats.org/markup-compatibility/2006">
-        <mc:Choice xmlns:a14="http://schemas.microsoft.com/office/drawing/2010/main" Requires="a14">
+      <mc:AlternateContent xmlns:mc="http://schemas.openxmlformats.org/markup-compatibility/2006" xmlns:a14="http://schemas.microsoft.com/office/drawing/2010/main">
+        <mc:Choice Requires="a14">
           <p:sp>
             <p:nvSpPr>
               <p:cNvPr id="22" name="TextBox 21">
@@ -3951,13 +4012,7 @@
                           <a:rPr lang="en-US" altLang="ko-KR" b="0" i="1" smtClean="0">
                             <a:latin typeface="Cambria Math" panose="02040503050406030204" pitchFamily="18" charset="0"/>
                           </a:rPr>
-                          <m:t>=</m:t>
-                        </m:r>
-                        <m:r>
-                          <a:rPr lang="en-US" altLang="ko-KR" b="0" i="1" smtClean="0">
-                            <a:latin typeface="Cambria Math" panose="02040503050406030204" pitchFamily="18" charset="0"/>
-                          </a:rPr>
-                          <m:t>175</m:t>
+                          <m:t>=175</m:t>
                         </m:r>
                         <m:r>
                           <a:rPr lang="en-US" altLang="ko-KR" b="0" i="1" smtClean="0">
@@ -4000,7 +4055,7 @@
             </p:txBody>
           </p:sp>
         </mc:Choice>
-        <mc:Fallback>
+        <mc:Fallback xmlns="">
           <p:sp>
             <p:nvSpPr>
               <p:cNvPr id="22" name="TextBox 21">

</xml_diff>

<commit_message>
naive bayes 계속 작성 중
</commit_message>
<xml_diff>
--- a/pics/2020-08-04-naive_bayes/pics.pptx
+++ b/pics/2020-08-04-naive_bayes/pics.pptx
@@ -7,6 +7,7 @@
   <p:sldIdLst>
     <p:sldId id="257" r:id="rId2"/>
     <p:sldId id="256" r:id="rId3"/>
+    <p:sldId id="258" r:id="rId4"/>
   </p:sldIdLst>
   <p:sldSz cx="12192000" cy="6858000"/>
   <p:notesSz cx="6858000" cy="9144000"/>
@@ -107,7 +108,7 @@
   </p:defaultTextStyle>
   <p:extLst>
     <p:ext uri="{EFAFB233-063F-42B5-8137-9DF3F51BA10A}">
-      <p15:sldGuideLst xmlns:p15="http://schemas.microsoft.com/office/powerpoint/2012/main"/>
+      <p15:sldGuideLst xmlns:p15="http://schemas.microsoft.com/office/powerpoint/2012/main" xmlns=""/>
     </p:ext>
   </p:extLst>
 </p:presentation>
@@ -135,7 +136,7 @@
           <p:cNvPr id="2" name="제목 1">
             <a:extLst>
               <a:ext uri="{FF2B5EF4-FFF2-40B4-BE49-F238E27FC236}">
-                <a16:creationId xmlns:a16="http://schemas.microsoft.com/office/drawing/2014/main" id="{51ABA9D9-205E-4ED7-893A-441D64194545}"/>
+                <a16:creationId xmlns:a16="http://schemas.microsoft.com/office/drawing/2014/main" xmlns="" id="{51ABA9D9-205E-4ED7-893A-441D64194545}"/>
               </a:ext>
             </a:extLst>
           </p:cNvPr>
@@ -172,7 +173,7 @@
           <p:cNvPr id="3" name="부제목 2">
             <a:extLst>
               <a:ext uri="{FF2B5EF4-FFF2-40B4-BE49-F238E27FC236}">
-                <a16:creationId xmlns:a16="http://schemas.microsoft.com/office/drawing/2014/main" id="{2BBCB3C8-00AA-4668-AC60-36EF5902E284}"/>
+                <a16:creationId xmlns:a16="http://schemas.microsoft.com/office/drawing/2014/main" xmlns="" id="{2BBCB3C8-00AA-4668-AC60-36EF5902E284}"/>
               </a:ext>
             </a:extLst>
           </p:cNvPr>
@@ -242,7 +243,7 @@
           <p:cNvPr id="4" name="날짜 개체 틀 3">
             <a:extLst>
               <a:ext uri="{FF2B5EF4-FFF2-40B4-BE49-F238E27FC236}">
-                <a16:creationId xmlns:a16="http://schemas.microsoft.com/office/drawing/2014/main" id="{B14C1110-74B9-47B6-849F-F3FFA3B6FDD4}"/>
+                <a16:creationId xmlns:a16="http://schemas.microsoft.com/office/drawing/2014/main" xmlns="" id="{B14C1110-74B9-47B6-849F-F3FFA3B6FDD4}"/>
               </a:ext>
             </a:extLst>
           </p:cNvPr>
@@ -260,7 +261,7 @@
           <a:p>
             <a:fld id="{6524A2ED-1836-4FD7-B408-9346E5A0F4FF}" type="datetimeFigureOut">
               <a:rPr lang="ko-KR" altLang="en-US" smtClean="0"/>
-              <a:t>2020-08-04</a:t>
+              <a:t>2020-08-05</a:t>
             </a:fld>
             <a:endParaRPr lang="ko-KR" altLang="en-US"/>
           </a:p>
@@ -271,7 +272,7 @@
           <p:cNvPr id="5" name="바닥글 개체 틀 4">
             <a:extLst>
               <a:ext uri="{FF2B5EF4-FFF2-40B4-BE49-F238E27FC236}">
-                <a16:creationId xmlns:a16="http://schemas.microsoft.com/office/drawing/2014/main" id="{E5601075-0C21-41D9-836D-C92683897B08}"/>
+                <a16:creationId xmlns:a16="http://schemas.microsoft.com/office/drawing/2014/main" xmlns="" id="{E5601075-0C21-41D9-836D-C92683897B08}"/>
               </a:ext>
             </a:extLst>
           </p:cNvPr>
@@ -296,7 +297,7 @@
           <p:cNvPr id="6" name="슬라이드 번호 개체 틀 5">
             <a:extLst>
               <a:ext uri="{FF2B5EF4-FFF2-40B4-BE49-F238E27FC236}">
-                <a16:creationId xmlns:a16="http://schemas.microsoft.com/office/drawing/2014/main" id="{AC9EC5E6-C8C7-4C83-9945-5E75F1231ED2}"/>
+                <a16:creationId xmlns:a16="http://schemas.microsoft.com/office/drawing/2014/main" xmlns="" id="{AC9EC5E6-C8C7-4C83-9945-5E75F1231ED2}"/>
               </a:ext>
             </a:extLst>
           </p:cNvPr>
@@ -355,7 +356,7 @@
           <p:cNvPr id="2" name="제목 1">
             <a:extLst>
               <a:ext uri="{FF2B5EF4-FFF2-40B4-BE49-F238E27FC236}">
-                <a16:creationId xmlns:a16="http://schemas.microsoft.com/office/drawing/2014/main" id="{5E45C088-EB30-46E8-A265-F6560D7F4A7A}"/>
+                <a16:creationId xmlns:a16="http://schemas.microsoft.com/office/drawing/2014/main" xmlns="" id="{5E45C088-EB30-46E8-A265-F6560D7F4A7A}"/>
               </a:ext>
             </a:extLst>
           </p:cNvPr>
@@ -383,7 +384,7 @@
           <p:cNvPr id="3" name="세로 텍스트 개체 틀 2">
             <a:extLst>
               <a:ext uri="{FF2B5EF4-FFF2-40B4-BE49-F238E27FC236}">
-                <a16:creationId xmlns:a16="http://schemas.microsoft.com/office/drawing/2014/main" id="{3CCC34F6-70D2-4616-A569-4CC361879A3A}"/>
+                <a16:creationId xmlns:a16="http://schemas.microsoft.com/office/drawing/2014/main" xmlns="" id="{3CCC34F6-70D2-4616-A569-4CC361879A3A}"/>
               </a:ext>
             </a:extLst>
           </p:cNvPr>
@@ -440,7 +441,7 @@
           <p:cNvPr id="4" name="날짜 개체 틀 3">
             <a:extLst>
               <a:ext uri="{FF2B5EF4-FFF2-40B4-BE49-F238E27FC236}">
-                <a16:creationId xmlns:a16="http://schemas.microsoft.com/office/drawing/2014/main" id="{FF9586E9-F225-4C5D-9FBE-8C841E4E62B5}"/>
+                <a16:creationId xmlns:a16="http://schemas.microsoft.com/office/drawing/2014/main" xmlns="" id="{FF9586E9-F225-4C5D-9FBE-8C841E4E62B5}"/>
               </a:ext>
             </a:extLst>
           </p:cNvPr>
@@ -458,7 +459,7 @@
           <a:p>
             <a:fld id="{6524A2ED-1836-4FD7-B408-9346E5A0F4FF}" type="datetimeFigureOut">
               <a:rPr lang="ko-KR" altLang="en-US" smtClean="0"/>
-              <a:t>2020-08-04</a:t>
+              <a:t>2020-08-05</a:t>
             </a:fld>
             <a:endParaRPr lang="ko-KR" altLang="en-US"/>
           </a:p>
@@ -469,7 +470,7 @@
           <p:cNvPr id="5" name="바닥글 개체 틀 4">
             <a:extLst>
               <a:ext uri="{FF2B5EF4-FFF2-40B4-BE49-F238E27FC236}">
-                <a16:creationId xmlns:a16="http://schemas.microsoft.com/office/drawing/2014/main" id="{025E41F0-0354-430B-9A17-29B4CB15576B}"/>
+                <a16:creationId xmlns:a16="http://schemas.microsoft.com/office/drawing/2014/main" xmlns="" id="{025E41F0-0354-430B-9A17-29B4CB15576B}"/>
               </a:ext>
             </a:extLst>
           </p:cNvPr>
@@ -494,7 +495,7 @@
           <p:cNvPr id="6" name="슬라이드 번호 개체 틀 5">
             <a:extLst>
               <a:ext uri="{FF2B5EF4-FFF2-40B4-BE49-F238E27FC236}">
-                <a16:creationId xmlns:a16="http://schemas.microsoft.com/office/drawing/2014/main" id="{8FFC9825-02FF-431F-9AA7-92BC41BB1261}"/>
+                <a16:creationId xmlns:a16="http://schemas.microsoft.com/office/drawing/2014/main" xmlns="" id="{8FFC9825-02FF-431F-9AA7-92BC41BB1261}"/>
               </a:ext>
             </a:extLst>
           </p:cNvPr>
@@ -553,7 +554,7 @@
           <p:cNvPr id="2" name="세로 제목 1">
             <a:extLst>
               <a:ext uri="{FF2B5EF4-FFF2-40B4-BE49-F238E27FC236}">
-                <a16:creationId xmlns:a16="http://schemas.microsoft.com/office/drawing/2014/main" id="{31934A13-D413-4E1E-9C36-12AB29615C0A}"/>
+                <a16:creationId xmlns:a16="http://schemas.microsoft.com/office/drawing/2014/main" xmlns="" id="{31934A13-D413-4E1E-9C36-12AB29615C0A}"/>
               </a:ext>
             </a:extLst>
           </p:cNvPr>
@@ -586,7 +587,7 @@
           <p:cNvPr id="3" name="세로 텍스트 개체 틀 2">
             <a:extLst>
               <a:ext uri="{FF2B5EF4-FFF2-40B4-BE49-F238E27FC236}">
-                <a16:creationId xmlns:a16="http://schemas.microsoft.com/office/drawing/2014/main" id="{07CD7B44-8D49-4096-9F3F-4624A83FC811}"/>
+                <a16:creationId xmlns:a16="http://schemas.microsoft.com/office/drawing/2014/main" xmlns="" id="{07CD7B44-8D49-4096-9F3F-4624A83FC811}"/>
               </a:ext>
             </a:extLst>
           </p:cNvPr>
@@ -648,7 +649,7 @@
           <p:cNvPr id="4" name="날짜 개체 틀 3">
             <a:extLst>
               <a:ext uri="{FF2B5EF4-FFF2-40B4-BE49-F238E27FC236}">
-                <a16:creationId xmlns:a16="http://schemas.microsoft.com/office/drawing/2014/main" id="{6AAA10A3-FB7E-41CD-825E-3D9BCA58BB1F}"/>
+                <a16:creationId xmlns:a16="http://schemas.microsoft.com/office/drawing/2014/main" xmlns="" id="{6AAA10A3-FB7E-41CD-825E-3D9BCA58BB1F}"/>
               </a:ext>
             </a:extLst>
           </p:cNvPr>
@@ -666,7 +667,7 @@
           <a:p>
             <a:fld id="{6524A2ED-1836-4FD7-B408-9346E5A0F4FF}" type="datetimeFigureOut">
               <a:rPr lang="ko-KR" altLang="en-US" smtClean="0"/>
-              <a:t>2020-08-04</a:t>
+              <a:t>2020-08-05</a:t>
             </a:fld>
             <a:endParaRPr lang="ko-KR" altLang="en-US"/>
           </a:p>
@@ -677,7 +678,7 @@
           <p:cNvPr id="5" name="바닥글 개체 틀 4">
             <a:extLst>
               <a:ext uri="{FF2B5EF4-FFF2-40B4-BE49-F238E27FC236}">
-                <a16:creationId xmlns:a16="http://schemas.microsoft.com/office/drawing/2014/main" id="{2853A1FF-1E68-4172-82E8-646B2A77DB43}"/>
+                <a16:creationId xmlns:a16="http://schemas.microsoft.com/office/drawing/2014/main" xmlns="" id="{2853A1FF-1E68-4172-82E8-646B2A77DB43}"/>
               </a:ext>
             </a:extLst>
           </p:cNvPr>
@@ -702,7 +703,7 @@
           <p:cNvPr id="6" name="슬라이드 번호 개체 틀 5">
             <a:extLst>
               <a:ext uri="{FF2B5EF4-FFF2-40B4-BE49-F238E27FC236}">
-                <a16:creationId xmlns:a16="http://schemas.microsoft.com/office/drawing/2014/main" id="{3F1119CA-2C25-4615-9A7A-7275AF9547F6}"/>
+                <a16:creationId xmlns:a16="http://schemas.microsoft.com/office/drawing/2014/main" xmlns="" id="{3F1119CA-2C25-4615-9A7A-7275AF9547F6}"/>
               </a:ext>
             </a:extLst>
           </p:cNvPr>
@@ -761,7 +762,7 @@
           <p:cNvPr id="2" name="제목 1">
             <a:extLst>
               <a:ext uri="{FF2B5EF4-FFF2-40B4-BE49-F238E27FC236}">
-                <a16:creationId xmlns:a16="http://schemas.microsoft.com/office/drawing/2014/main" id="{252ED72E-987C-4252-8E38-F96D9DF67DCC}"/>
+                <a16:creationId xmlns:a16="http://schemas.microsoft.com/office/drawing/2014/main" xmlns="" id="{252ED72E-987C-4252-8E38-F96D9DF67DCC}"/>
               </a:ext>
             </a:extLst>
           </p:cNvPr>
@@ -789,7 +790,7 @@
           <p:cNvPr id="3" name="내용 개체 틀 2">
             <a:extLst>
               <a:ext uri="{FF2B5EF4-FFF2-40B4-BE49-F238E27FC236}">
-                <a16:creationId xmlns:a16="http://schemas.microsoft.com/office/drawing/2014/main" id="{5BE09A2D-9E76-447F-B096-F08CA0C06FAF}"/>
+                <a16:creationId xmlns:a16="http://schemas.microsoft.com/office/drawing/2014/main" xmlns="" id="{5BE09A2D-9E76-447F-B096-F08CA0C06FAF}"/>
               </a:ext>
             </a:extLst>
           </p:cNvPr>
@@ -846,7 +847,7 @@
           <p:cNvPr id="4" name="날짜 개체 틀 3">
             <a:extLst>
               <a:ext uri="{FF2B5EF4-FFF2-40B4-BE49-F238E27FC236}">
-                <a16:creationId xmlns:a16="http://schemas.microsoft.com/office/drawing/2014/main" id="{DCCDF9A2-7B93-4A84-8295-669E29644D15}"/>
+                <a16:creationId xmlns:a16="http://schemas.microsoft.com/office/drawing/2014/main" xmlns="" id="{DCCDF9A2-7B93-4A84-8295-669E29644D15}"/>
               </a:ext>
             </a:extLst>
           </p:cNvPr>
@@ -864,7 +865,7 @@
           <a:p>
             <a:fld id="{6524A2ED-1836-4FD7-B408-9346E5A0F4FF}" type="datetimeFigureOut">
               <a:rPr lang="ko-KR" altLang="en-US" smtClean="0"/>
-              <a:t>2020-08-04</a:t>
+              <a:t>2020-08-05</a:t>
             </a:fld>
             <a:endParaRPr lang="ko-KR" altLang="en-US"/>
           </a:p>
@@ -875,7 +876,7 @@
           <p:cNvPr id="5" name="바닥글 개체 틀 4">
             <a:extLst>
               <a:ext uri="{FF2B5EF4-FFF2-40B4-BE49-F238E27FC236}">
-                <a16:creationId xmlns:a16="http://schemas.microsoft.com/office/drawing/2014/main" id="{EBBFE3DF-AA14-47DD-8541-B409E3157E30}"/>
+                <a16:creationId xmlns:a16="http://schemas.microsoft.com/office/drawing/2014/main" xmlns="" id="{EBBFE3DF-AA14-47DD-8541-B409E3157E30}"/>
               </a:ext>
             </a:extLst>
           </p:cNvPr>
@@ -900,7 +901,7 @@
           <p:cNvPr id="6" name="슬라이드 번호 개체 틀 5">
             <a:extLst>
               <a:ext uri="{FF2B5EF4-FFF2-40B4-BE49-F238E27FC236}">
-                <a16:creationId xmlns:a16="http://schemas.microsoft.com/office/drawing/2014/main" id="{B1E0DDF1-F210-4305-91EB-34EAD7E6A45A}"/>
+                <a16:creationId xmlns:a16="http://schemas.microsoft.com/office/drawing/2014/main" xmlns="" id="{B1E0DDF1-F210-4305-91EB-34EAD7E6A45A}"/>
               </a:ext>
             </a:extLst>
           </p:cNvPr>
@@ -959,7 +960,7 @@
           <p:cNvPr id="2" name="제목 1">
             <a:extLst>
               <a:ext uri="{FF2B5EF4-FFF2-40B4-BE49-F238E27FC236}">
-                <a16:creationId xmlns:a16="http://schemas.microsoft.com/office/drawing/2014/main" id="{F77D4DEB-500F-43CF-845B-9F7BF1CDFA7B}"/>
+                <a16:creationId xmlns:a16="http://schemas.microsoft.com/office/drawing/2014/main" xmlns="" id="{F77D4DEB-500F-43CF-845B-9F7BF1CDFA7B}"/>
               </a:ext>
             </a:extLst>
           </p:cNvPr>
@@ -996,7 +997,7 @@
           <p:cNvPr id="3" name="텍스트 개체 틀 2">
             <a:extLst>
               <a:ext uri="{FF2B5EF4-FFF2-40B4-BE49-F238E27FC236}">
-                <a16:creationId xmlns:a16="http://schemas.microsoft.com/office/drawing/2014/main" id="{CE62F204-A7EF-44A2-AA73-68DF25DCC3FE}"/>
+                <a16:creationId xmlns:a16="http://schemas.microsoft.com/office/drawing/2014/main" xmlns="" id="{CE62F204-A7EF-44A2-AA73-68DF25DCC3FE}"/>
               </a:ext>
             </a:extLst>
           </p:cNvPr>
@@ -1121,7 +1122,7 @@
           <p:cNvPr id="4" name="날짜 개체 틀 3">
             <a:extLst>
               <a:ext uri="{FF2B5EF4-FFF2-40B4-BE49-F238E27FC236}">
-                <a16:creationId xmlns:a16="http://schemas.microsoft.com/office/drawing/2014/main" id="{9B5E0DB3-BD84-4DF2-9CA0-ACCD34A6A7E4}"/>
+                <a16:creationId xmlns:a16="http://schemas.microsoft.com/office/drawing/2014/main" xmlns="" id="{9B5E0DB3-BD84-4DF2-9CA0-ACCD34A6A7E4}"/>
               </a:ext>
             </a:extLst>
           </p:cNvPr>
@@ -1139,7 +1140,7 @@
           <a:p>
             <a:fld id="{6524A2ED-1836-4FD7-B408-9346E5A0F4FF}" type="datetimeFigureOut">
               <a:rPr lang="ko-KR" altLang="en-US" smtClean="0"/>
-              <a:t>2020-08-04</a:t>
+              <a:t>2020-08-05</a:t>
             </a:fld>
             <a:endParaRPr lang="ko-KR" altLang="en-US"/>
           </a:p>
@@ -1150,7 +1151,7 @@
           <p:cNvPr id="5" name="바닥글 개체 틀 4">
             <a:extLst>
               <a:ext uri="{FF2B5EF4-FFF2-40B4-BE49-F238E27FC236}">
-                <a16:creationId xmlns:a16="http://schemas.microsoft.com/office/drawing/2014/main" id="{44088AC8-F21B-481F-996E-6A6C54B61D00}"/>
+                <a16:creationId xmlns:a16="http://schemas.microsoft.com/office/drawing/2014/main" xmlns="" id="{44088AC8-F21B-481F-996E-6A6C54B61D00}"/>
               </a:ext>
             </a:extLst>
           </p:cNvPr>
@@ -1175,7 +1176,7 @@
           <p:cNvPr id="6" name="슬라이드 번호 개체 틀 5">
             <a:extLst>
               <a:ext uri="{FF2B5EF4-FFF2-40B4-BE49-F238E27FC236}">
-                <a16:creationId xmlns:a16="http://schemas.microsoft.com/office/drawing/2014/main" id="{3B19FA85-095D-419D-BDCF-ECE222CC58AC}"/>
+                <a16:creationId xmlns:a16="http://schemas.microsoft.com/office/drawing/2014/main" xmlns="" id="{3B19FA85-095D-419D-BDCF-ECE222CC58AC}"/>
               </a:ext>
             </a:extLst>
           </p:cNvPr>
@@ -1234,7 +1235,7 @@
           <p:cNvPr id="2" name="제목 1">
             <a:extLst>
               <a:ext uri="{FF2B5EF4-FFF2-40B4-BE49-F238E27FC236}">
-                <a16:creationId xmlns:a16="http://schemas.microsoft.com/office/drawing/2014/main" id="{2DC4D65C-F02D-4ACC-8488-1B9B0144AA20}"/>
+                <a16:creationId xmlns:a16="http://schemas.microsoft.com/office/drawing/2014/main" xmlns="" id="{2DC4D65C-F02D-4ACC-8488-1B9B0144AA20}"/>
               </a:ext>
             </a:extLst>
           </p:cNvPr>
@@ -1262,7 +1263,7 @@
           <p:cNvPr id="3" name="내용 개체 틀 2">
             <a:extLst>
               <a:ext uri="{FF2B5EF4-FFF2-40B4-BE49-F238E27FC236}">
-                <a16:creationId xmlns:a16="http://schemas.microsoft.com/office/drawing/2014/main" id="{E493600B-68D3-4B8D-867D-23248E609D18}"/>
+                <a16:creationId xmlns:a16="http://schemas.microsoft.com/office/drawing/2014/main" xmlns="" id="{E493600B-68D3-4B8D-867D-23248E609D18}"/>
               </a:ext>
             </a:extLst>
           </p:cNvPr>
@@ -1324,7 +1325,7 @@
           <p:cNvPr id="4" name="내용 개체 틀 3">
             <a:extLst>
               <a:ext uri="{FF2B5EF4-FFF2-40B4-BE49-F238E27FC236}">
-                <a16:creationId xmlns:a16="http://schemas.microsoft.com/office/drawing/2014/main" id="{8FEE9BE7-3AD7-4209-9969-1206DEB3B380}"/>
+                <a16:creationId xmlns:a16="http://schemas.microsoft.com/office/drawing/2014/main" xmlns="" id="{8FEE9BE7-3AD7-4209-9969-1206DEB3B380}"/>
               </a:ext>
             </a:extLst>
           </p:cNvPr>
@@ -1386,7 +1387,7 @@
           <p:cNvPr id="5" name="날짜 개체 틀 4">
             <a:extLst>
               <a:ext uri="{FF2B5EF4-FFF2-40B4-BE49-F238E27FC236}">
-                <a16:creationId xmlns:a16="http://schemas.microsoft.com/office/drawing/2014/main" id="{38B71F8D-7092-4574-88C9-C905A6F6878D}"/>
+                <a16:creationId xmlns:a16="http://schemas.microsoft.com/office/drawing/2014/main" xmlns="" id="{38B71F8D-7092-4574-88C9-C905A6F6878D}"/>
               </a:ext>
             </a:extLst>
           </p:cNvPr>
@@ -1404,7 +1405,7 @@
           <a:p>
             <a:fld id="{6524A2ED-1836-4FD7-B408-9346E5A0F4FF}" type="datetimeFigureOut">
               <a:rPr lang="ko-KR" altLang="en-US" smtClean="0"/>
-              <a:t>2020-08-04</a:t>
+              <a:t>2020-08-05</a:t>
             </a:fld>
             <a:endParaRPr lang="ko-KR" altLang="en-US"/>
           </a:p>
@@ -1415,7 +1416,7 @@
           <p:cNvPr id="6" name="바닥글 개체 틀 5">
             <a:extLst>
               <a:ext uri="{FF2B5EF4-FFF2-40B4-BE49-F238E27FC236}">
-                <a16:creationId xmlns:a16="http://schemas.microsoft.com/office/drawing/2014/main" id="{04A82CC1-CA44-4BCE-B746-D78773F1B01A}"/>
+                <a16:creationId xmlns:a16="http://schemas.microsoft.com/office/drawing/2014/main" xmlns="" id="{04A82CC1-CA44-4BCE-B746-D78773F1B01A}"/>
               </a:ext>
             </a:extLst>
           </p:cNvPr>
@@ -1440,7 +1441,7 @@
           <p:cNvPr id="7" name="슬라이드 번호 개체 틀 6">
             <a:extLst>
               <a:ext uri="{FF2B5EF4-FFF2-40B4-BE49-F238E27FC236}">
-                <a16:creationId xmlns:a16="http://schemas.microsoft.com/office/drawing/2014/main" id="{D0757D95-4EF0-42B0-928C-9AF93E01AC6B}"/>
+                <a16:creationId xmlns:a16="http://schemas.microsoft.com/office/drawing/2014/main" xmlns="" id="{D0757D95-4EF0-42B0-928C-9AF93E01AC6B}"/>
               </a:ext>
             </a:extLst>
           </p:cNvPr>
@@ -1499,7 +1500,7 @@
           <p:cNvPr id="2" name="제목 1">
             <a:extLst>
               <a:ext uri="{FF2B5EF4-FFF2-40B4-BE49-F238E27FC236}">
-                <a16:creationId xmlns:a16="http://schemas.microsoft.com/office/drawing/2014/main" id="{8830AD51-4101-480C-B9AE-8DC2A1CE8B90}"/>
+                <a16:creationId xmlns:a16="http://schemas.microsoft.com/office/drawing/2014/main" xmlns="" id="{8830AD51-4101-480C-B9AE-8DC2A1CE8B90}"/>
               </a:ext>
             </a:extLst>
           </p:cNvPr>
@@ -1532,7 +1533,7 @@
           <p:cNvPr id="3" name="텍스트 개체 틀 2">
             <a:extLst>
               <a:ext uri="{FF2B5EF4-FFF2-40B4-BE49-F238E27FC236}">
-                <a16:creationId xmlns:a16="http://schemas.microsoft.com/office/drawing/2014/main" id="{45D5C7B8-F248-42BF-8B94-59D91FD32D54}"/>
+                <a16:creationId xmlns:a16="http://schemas.microsoft.com/office/drawing/2014/main" xmlns="" id="{45D5C7B8-F248-42BF-8B94-59D91FD32D54}"/>
               </a:ext>
             </a:extLst>
           </p:cNvPr>
@@ -1603,7 +1604,7 @@
           <p:cNvPr id="4" name="내용 개체 틀 3">
             <a:extLst>
               <a:ext uri="{FF2B5EF4-FFF2-40B4-BE49-F238E27FC236}">
-                <a16:creationId xmlns:a16="http://schemas.microsoft.com/office/drawing/2014/main" id="{91A48B8A-52D8-4796-9533-CA4C24315DE3}"/>
+                <a16:creationId xmlns:a16="http://schemas.microsoft.com/office/drawing/2014/main" xmlns="" id="{91A48B8A-52D8-4796-9533-CA4C24315DE3}"/>
               </a:ext>
             </a:extLst>
           </p:cNvPr>
@@ -1665,7 +1666,7 @@
           <p:cNvPr id="5" name="텍스트 개체 틀 4">
             <a:extLst>
               <a:ext uri="{FF2B5EF4-FFF2-40B4-BE49-F238E27FC236}">
-                <a16:creationId xmlns:a16="http://schemas.microsoft.com/office/drawing/2014/main" id="{8C34ACA6-8F1D-4A46-B582-A848067733E8}"/>
+                <a16:creationId xmlns:a16="http://schemas.microsoft.com/office/drawing/2014/main" xmlns="" id="{8C34ACA6-8F1D-4A46-B582-A848067733E8}"/>
               </a:ext>
             </a:extLst>
           </p:cNvPr>
@@ -1736,7 +1737,7 @@
           <p:cNvPr id="6" name="내용 개체 틀 5">
             <a:extLst>
               <a:ext uri="{FF2B5EF4-FFF2-40B4-BE49-F238E27FC236}">
-                <a16:creationId xmlns:a16="http://schemas.microsoft.com/office/drawing/2014/main" id="{3B57E326-5C8F-4282-8629-B7BE90B706D4}"/>
+                <a16:creationId xmlns:a16="http://schemas.microsoft.com/office/drawing/2014/main" xmlns="" id="{3B57E326-5C8F-4282-8629-B7BE90B706D4}"/>
               </a:ext>
             </a:extLst>
           </p:cNvPr>
@@ -1798,7 +1799,7 @@
           <p:cNvPr id="7" name="날짜 개체 틀 6">
             <a:extLst>
               <a:ext uri="{FF2B5EF4-FFF2-40B4-BE49-F238E27FC236}">
-                <a16:creationId xmlns:a16="http://schemas.microsoft.com/office/drawing/2014/main" id="{A5CB93B7-9D1A-45C8-9219-244CDEDCE9B6}"/>
+                <a16:creationId xmlns:a16="http://schemas.microsoft.com/office/drawing/2014/main" xmlns="" id="{A5CB93B7-9D1A-45C8-9219-244CDEDCE9B6}"/>
               </a:ext>
             </a:extLst>
           </p:cNvPr>
@@ -1816,7 +1817,7 @@
           <a:p>
             <a:fld id="{6524A2ED-1836-4FD7-B408-9346E5A0F4FF}" type="datetimeFigureOut">
               <a:rPr lang="ko-KR" altLang="en-US" smtClean="0"/>
-              <a:t>2020-08-04</a:t>
+              <a:t>2020-08-05</a:t>
             </a:fld>
             <a:endParaRPr lang="ko-KR" altLang="en-US"/>
           </a:p>
@@ -1827,7 +1828,7 @@
           <p:cNvPr id="8" name="바닥글 개체 틀 7">
             <a:extLst>
               <a:ext uri="{FF2B5EF4-FFF2-40B4-BE49-F238E27FC236}">
-                <a16:creationId xmlns:a16="http://schemas.microsoft.com/office/drawing/2014/main" id="{6F547E55-2886-465C-961C-1827F2AC29E6}"/>
+                <a16:creationId xmlns:a16="http://schemas.microsoft.com/office/drawing/2014/main" xmlns="" id="{6F547E55-2886-465C-961C-1827F2AC29E6}"/>
               </a:ext>
             </a:extLst>
           </p:cNvPr>
@@ -1852,7 +1853,7 @@
           <p:cNvPr id="9" name="슬라이드 번호 개체 틀 8">
             <a:extLst>
               <a:ext uri="{FF2B5EF4-FFF2-40B4-BE49-F238E27FC236}">
-                <a16:creationId xmlns:a16="http://schemas.microsoft.com/office/drawing/2014/main" id="{1943D0A1-F41D-46FF-8288-1ACBB6AA6121}"/>
+                <a16:creationId xmlns:a16="http://schemas.microsoft.com/office/drawing/2014/main" xmlns="" id="{1943D0A1-F41D-46FF-8288-1ACBB6AA6121}"/>
               </a:ext>
             </a:extLst>
           </p:cNvPr>
@@ -1911,7 +1912,7 @@
           <p:cNvPr id="2" name="제목 1">
             <a:extLst>
               <a:ext uri="{FF2B5EF4-FFF2-40B4-BE49-F238E27FC236}">
-                <a16:creationId xmlns:a16="http://schemas.microsoft.com/office/drawing/2014/main" id="{EEA65A8B-5449-4FF8-8694-32ECF40F2AD9}"/>
+                <a16:creationId xmlns:a16="http://schemas.microsoft.com/office/drawing/2014/main" xmlns="" id="{EEA65A8B-5449-4FF8-8694-32ECF40F2AD9}"/>
               </a:ext>
             </a:extLst>
           </p:cNvPr>
@@ -1939,7 +1940,7 @@
           <p:cNvPr id="3" name="날짜 개체 틀 2">
             <a:extLst>
               <a:ext uri="{FF2B5EF4-FFF2-40B4-BE49-F238E27FC236}">
-                <a16:creationId xmlns:a16="http://schemas.microsoft.com/office/drawing/2014/main" id="{33D0DCEE-B6DF-4B5B-A5DA-975F204D78CB}"/>
+                <a16:creationId xmlns:a16="http://schemas.microsoft.com/office/drawing/2014/main" xmlns="" id="{33D0DCEE-B6DF-4B5B-A5DA-975F204D78CB}"/>
               </a:ext>
             </a:extLst>
           </p:cNvPr>
@@ -1957,7 +1958,7 @@
           <a:p>
             <a:fld id="{6524A2ED-1836-4FD7-B408-9346E5A0F4FF}" type="datetimeFigureOut">
               <a:rPr lang="ko-KR" altLang="en-US" smtClean="0"/>
-              <a:t>2020-08-04</a:t>
+              <a:t>2020-08-05</a:t>
             </a:fld>
             <a:endParaRPr lang="ko-KR" altLang="en-US"/>
           </a:p>
@@ -1968,7 +1969,7 @@
           <p:cNvPr id="4" name="바닥글 개체 틀 3">
             <a:extLst>
               <a:ext uri="{FF2B5EF4-FFF2-40B4-BE49-F238E27FC236}">
-                <a16:creationId xmlns:a16="http://schemas.microsoft.com/office/drawing/2014/main" id="{425A6151-9A89-4208-BEA7-283B247C36D4}"/>
+                <a16:creationId xmlns:a16="http://schemas.microsoft.com/office/drawing/2014/main" xmlns="" id="{425A6151-9A89-4208-BEA7-283B247C36D4}"/>
               </a:ext>
             </a:extLst>
           </p:cNvPr>
@@ -1993,7 +1994,7 @@
           <p:cNvPr id="5" name="슬라이드 번호 개체 틀 4">
             <a:extLst>
               <a:ext uri="{FF2B5EF4-FFF2-40B4-BE49-F238E27FC236}">
-                <a16:creationId xmlns:a16="http://schemas.microsoft.com/office/drawing/2014/main" id="{8DB52075-30F6-40E7-8CC0-F63477CA2537}"/>
+                <a16:creationId xmlns:a16="http://schemas.microsoft.com/office/drawing/2014/main" xmlns="" id="{8DB52075-30F6-40E7-8CC0-F63477CA2537}"/>
               </a:ext>
             </a:extLst>
           </p:cNvPr>
@@ -2052,7 +2053,7 @@
           <p:cNvPr id="2" name="날짜 개체 틀 1">
             <a:extLst>
               <a:ext uri="{FF2B5EF4-FFF2-40B4-BE49-F238E27FC236}">
-                <a16:creationId xmlns:a16="http://schemas.microsoft.com/office/drawing/2014/main" id="{C2E93CA4-A618-41A3-BA7D-805F7D76DBA6}"/>
+                <a16:creationId xmlns:a16="http://schemas.microsoft.com/office/drawing/2014/main" xmlns="" id="{C2E93CA4-A618-41A3-BA7D-805F7D76DBA6}"/>
               </a:ext>
             </a:extLst>
           </p:cNvPr>
@@ -2070,7 +2071,7 @@
           <a:p>
             <a:fld id="{6524A2ED-1836-4FD7-B408-9346E5A0F4FF}" type="datetimeFigureOut">
               <a:rPr lang="ko-KR" altLang="en-US" smtClean="0"/>
-              <a:t>2020-08-04</a:t>
+              <a:t>2020-08-05</a:t>
             </a:fld>
             <a:endParaRPr lang="ko-KR" altLang="en-US"/>
           </a:p>
@@ -2081,7 +2082,7 @@
           <p:cNvPr id="3" name="바닥글 개체 틀 2">
             <a:extLst>
               <a:ext uri="{FF2B5EF4-FFF2-40B4-BE49-F238E27FC236}">
-                <a16:creationId xmlns:a16="http://schemas.microsoft.com/office/drawing/2014/main" id="{3188900F-35D7-43FE-B140-F38FDBD19980}"/>
+                <a16:creationId xmlns:a16="http://schemas.microsoft.com/office/drawing/2014/main" xmlns="" id="{3188900F-35D7-43FE-B140-F38FDBD19980}"/>
               </a:ext>
             </a:extLst>
           </p:cNvPr>
@@ -2106,7 +2107,7 @@
           <p:cNvPr id="4" name="슬라이드 번호 개체 틀 3">
             <a:extLst>
               <a:ext uri="{FF2B5EF4-FFF2-40B4-BE49-F238E27FC236}">
-                <a16:creationId xmlns:a16="http://schemas.microsoft.com/office/drawing/2014/main" id="{EFB47F78-07F8-4A10-B9AE-BCC368429A6A}"/>
+                <a16:creationId xmlns:a16="http://schemas.microsoft.com/office/drawing/2014/main" xmlns="" id="{EFB47F78-07F8-4A10-B9AE-BCC368429A6A}"/>
               </a:ext>
             </a:extLst>
           </p:cNvPr>
@@ -2165,7 +2166,7 @@
           <p:cNvPr id="2" name="제목 1">
             <a:extLst>
               <a:ext uri="{FF2B5EF4-FFF2-40B4-BE49-F238E27FC236}">
-                <a16:creationId xmlns:a16="http://schemas.microsoft.com/office/drawing/2014/main" id="{F69DDC5A-1D36-459B-8DB6-D5ADCCB552B8}"/>
+                <a16:creationId xmlns:a16="http://schemas.microsoft.com/office/drawing/2014/main" xmlns="" id="{F69DDC5A-1D36-459B-8DB6-D5ADCCB552B8}"/>
               </a:ext>
             </a:extLst>
           </p:cNvPr>
@@ -2202,7 +2203,7 @@
           <p:cNvPr id="3" name="내용 개체 틀 2">
             <a:extLst>
               <a:ext uri="{FF2B5EF4-FFF2-40B4-BE49-F238E27FC236}">
-                <a16:creationId xmlns:a16="http://schemas.microsoft.com/office/drawing/2014/main" id="{DD1FD8A1-56CB-4FEF-9C3B-57BCD488CEED}"/>
+                <a16:creationId xmlns:a16="http://schemas.microsoft.com/office/drawing/2014/main" xmlns="" id="{DD1FD8A1-56CB-4FEF-9C3B-57BCD488CEED}"/>
               </a:ext>
             </a:extLst>
           </p:cNvPr>
@@ -2292,7 +2293,7 @@
           <p:cNvPr id="4" name="텍스트 개체 틀 3">
             <a:extLst>
               <a:ext uri="{FF2B5EF4-FFF2-40B4-BE49-F238E27FC236}">
-                <a16:creationId xmlns:a16="http://schemas.microsoft.com/office/drawing/2014/main" id="{2E412416-D32F-4A3E-8A8F-34259B20B600}"/>
+                <a16:creationId xmlns:a16="http://schemas.microsoft.com/office/drawing/2014/main" xmlns="" id="{2E412416-D32F-4A3E-8A8F-34259B20B600}"/>
               </a:ext>
             </a:extLst>
           </p:cNvPr>
@@ -2363,7 +2364,7 @@
           <p:cNvPr id="5" name="날짜 개체 틀 4">
             <a:extLst>
               <a:ext uri="{FF2B5EF4-FFF2-40B4-BE49-F238E27FC236}">
-                <a16:creationId xmlns:a16="http://schemas.microsoft.com/office/drawing/2014/main" id="{BDE23D8F-0F02-4E03-8C16-A0893F9B6EC3}"/>
+                <a16:creationId xmlns:a16="http://schemas.microsoft.com/office/drawing/2014/main" xmlns="" id="{BDE23D8F-0F02-4E03-8C16-A0893F9B6EC3}"/>
               </a:ext>
             </a:extLst>
           </p:cNvPr>
@@ -2381,7 +2382,7 @@
           <a:p>
             <a:fld id="{6524A2ED-1836-4FD7-B408-9346E5A0F4FF}" type="datetimeFigureOut">
               <a:rPr lang="ko-KR" altLang="en-US" smtClean="0"/>
-              <a:t>2020-08-04</a:t>
+              <a:t>2020-08-05</a:t>
             </a:fld>
             <a:endParaRPr lang="ko-KR" altLang="en-US"/>
           </a:p>
@@ -2392,7 +2393,7 @@
           <p:cNvPr id="6" name="바닥글 개체 틀 5">
             <a:extLst>
               <a:ext uri="{FF2B5EF4-FFF2-40B4-BE49-F238E27FC236}">
-                <a16:creationId xmlns:a16="http://schemas.microsoft.com/office/drawing/2014/main" id="{F044F540-B339-4243-9115-8C8677F26FF8}"/>
+                <a16:creationId xmlns:a16="http://schemas.microsoft.com/office/drawing/2014/main" xmlns="" id="{F044F540-B339-4243-9115-8C8677F26FF8}"/>
               </a:ext>
             </a:extLst>
           </p:cNvPr>
@@ -2417,7 +2418,7 @@
           <p:cNvPr id="7" name="슬라이드 번호 개체 틀 6">
             <a:extLst>
               <a:ext uri="{FF2B5EF4-FFF2-40B4-BE49-F238E27FC236}">
-                <a16:creationId xmlns:a16="http://schemas.microsoft.com/office/drawing/2014/main" id="{7394CDBC-4C15-4339-9A64-949913698B8C}"/>
+                <a16:creationId xmlns:a16="http://schemas.microsoft.com/office/drawing/2014/main" xmlns="" id="{7394CDBC-4C15-4339-9A64-949913698B8C}"/>
               </a:ext>
             </a:extLst>
           </p:cNvPr>
@@ -2476,7 +2477,7 @@
           <p:cNvPr id="2" name="제목 1">
             <a:extLst>
               <a:ext uri="{FF2B5EF4-FFF2-40B4-BE49-F238E27FC236}">
-                <a16:creationId xmlns:a16="http://schemas.microsoft.com/office/drawing/2014/main" id="{01C0E8C8-C4BA-46A9-AEEB-AFAC5AD63387}"/>
+                <a16:creationId xmlns:a16="http://schemas.microsoft.com/office/drawing/2014/main" xmlns="" id="{01C0E8C8-C4BA-46A9-AEEB-AFAC5AD63387}"/>
               </a:ext>
             </a:extLst>
           </p:cNvPr>
@@ -2513,7 +2514,7 @@
           <p:cNvPr id="3" name="그림 개체 틀 2">
             <a:extLst>
               <a:ext uri="{FF2B5EF4-FFF2-40B4-BE49-F238E27FC236}">
-                <a16:creationId xmlns:a16="http://schemas.microsoft.com/office/drawing/2014/main" id="{77F1CF3A-0BAC-4B8F-AD1E-278055233F52}"/>
+                <a16:creationId xmlns:a16="http://schemas.microsoft.com/office/drawing/2014/main" xmlns="" id="{77F1CF3A-0BAC-4B8F-AD1E-278055233F52}"/>
               </a:ext>
             </a:extLst>
           </p:cNvPr>
@@ -2580,7 +2581,7 @@
           <p:cNvPr id="4" name="텍스트 개체 틀 3">
             <a:extLst>
               <a:ext uri="{FF2B5EF4-FFF2-40B4-BE49-F238E27FC236}">
-                <a16:creationId xmlns:a16="http://schemas.microsoft.com/office/drawing/2014/main" id="{3B3C3D0F-D138-43CB-A69E-EDA89F86BEC6}"/>
+                <a16:creationId xmlns:a16="http://schemas.microsoft.com/office/drawing/2014/main" xmlns="" id="{3B3C3D0F-D138-43CB-A69E-EDA89F86BEC6}"/>
               </a:ext>
             </a:extLst>
           </p:cNvPr>
@@ -2651,7 +2652,7 @@
           <p:cNvPr id="5" name="날짜 개체 틀 4">
             <a:extLst>
               <a:ext uri="{FF2B5EF4-FFF2-40B4-BE49-F238E27FC236}">
-                <a16:creationId xmlns:a16="http://schemas.microsoft.com/office/drawing/2014/main" id="{D4865049-1A66-40AD-B8A7-34599E4BD4C1}"/>
+                <a16:creationId xmlns:a16="http://schemas.microsoft.com/office/drawing/2014/main" xmlns="" id="{D4865049-1A66-40AD-B8A7-34599E4BD4C1}"/>
               </a:ext>
             </a:extLst>
           </p:cNvPr>
@@ -2669,7 +2670,7 @@
           <a:p>
             <a:fld id="{6524A2ED-1836-4FD7-B408-9346E5A0F4FF}" type="datetimeFigureOut">
               <a:rPr lang="ko-KR" altLang="en-US" smtClean="0"/>
-              <a:t>2020-08-04</a:t>
+              <a:t>2020-08-05</a:t>
             </a:fld>
             <a:endParaRPr lang="ko-KR" altLang="en-US"/>
           </a:p>
@@ -2680,7 +2681,7 @@
           <p:cNvPr id="6" name="바닥글 개체 틀 5">
             <a:extLst>
               <a:ext uri="{FF2B5EF4-FFF2-40B4-BE49-F238E27FC236}">
-                <a16:creationId xmlns:a16="http://schemas.microsoft.com/office/drawing/2014/main" id="{FBED27D5-31D9-43C0-9E43-066F69712160}"/>
+                <a16:creationId xmlns:a16="http://schemas.microsoft.com/office/drawing/2014/main" xmlns="" id="{FBED27D5-31D9-43C0-9E43-066F69712160}"/>
               </a:ext>
             </a:extLst>
           </p:cNvPr>
@@ -2705,7 +2706,7 @@
           <p:cNvPr id="7" name="슬라이드 번호 개체 틀 6">
             <a:extLst>
               <a:ext uri="{FF2B5EF4-FFF2-40B4-BE49-F238E27FC236}">
-                <a16:creationId xmlns:a16="http://schemas.microsoft.com/office/drawing/2014/main" id="{631D31E4-B259-4639-A927-AB76B8FFD612}"/>
+                <a16:creationId xmlns:a16="http://schemas.microsoft.com/office/drawing/2014/main" xmlns="" id="{631D31E4-B259-4639-A927-AB76B8FFD612}"/>
               </a:ext>
             </a:extLst>
           </p:cNvPr>
@@ -2769,7 +2770,7 @@
           <p:cNvPr id="2" name="제목 개체 틀 1">
             <a:extLst>
               <a:ext uri="{FF2B5EF4-FFF2-40B4-BE49-F238E27FC236}">
-                <a16:creationId xmlns:a16="http://schemas.microsoft.com/office/drawing/2014/main" id="{C53049A8-53F2-4FA2-A03A-BFBD655607D9}"/>
+                <a16:creationId xmlns:a16="http://schemas.microsoft.com/office/drawing/2014/main" xmlns="" id="{C53049A8-53F2-4FA2-A03A-BFBD655607D9}"/>
               </a:ext>
             </a:extLst>
           </p:cNvPr>
@@ -2807,7 +2808,7 @@
           <p:cNvPr id="3" name="텍스트 개체 틀 2">
             <a:extLst>
               <a:ext uri="{FF2B5EF4-FFF2-40B4-BE49-F238E27FC236}">
-                <a16:creationId xmlns:a16="http://schemas.microsoft.com/office/drawing/2014/main" id="{2757E06B-5C9F-4328-8355-9484F594DEFA}"/>
+                <a16:creationId xmlns:a16="http://schemas.microsoft.com/office/drawing/2014/main" xmlns="" id="{2757E06B-5C9F-4328-8355-9484F594DEFA}"/>
               </a:ext>
             </a:extLst>
           </p:cNvPr>
@@ -2874,7 +2875,7 @@
           <p:cNvPr id="4" name="날짜 개체 틀 3">
             <a:extLst>
               <a:ext uri="{FF2B5EF4-FFF2-40B4-BE49-F238E27FC236}">
-                <a16:creationId xmlns:a16="http://schemas.microsoft.com/office/drawing/2014/main" id="{0BE520D5-ADCD-4450-A1BD-783568CD3136}"/>
+                <a16:creationId xmlns:a16="http://schemas.microsoft.com/office/drawing/2014/main" xmlns="" id="{0BE520D5-ADCD-4450-A1BD-783568CD3136}"/>
               </a:ext>
             </a:extLst>
           </p:cNvPr>
@@ -2910,7 +2911,7 @@
           <a:p>
             <a:fld id="{6524A2ED-1836-4FD7-B408-9346E5A0F4FF}" type="datetimeFigureOut">
               <a:rPr lang="ko-KR" altLang="en-US" smtClean="0"/>
-              <a:t>2020-08-04</a:t>
+              <a:t>2020-08-05</a:t>
             </a:fld>
             <a:endParaRPr lang="ko-KR" altLang="en-US"/>
           </a:p>
@@ -2921,7 +2922,7 @@
           <p:cNvPr id="5" name="바닥글 개체 틀 4">
             <a:extLst>
               <a:ext uri="{FF2B5EF4-FFF2-40B4-BE49-F238E27FC236}">
-                <a16:creationId xmlns:a16="http://schemas.microsoft.com/office/drawing/2014/main" id="{41E6BCA6-E3E1-48EE-B70F-DA4BB32DB936}"/>
+                <a16:creationId xmlns:a16="http://schemas.microsoft.com/office/drawing/2014/main" xmlns="" id="{41E6BCA6-E3E1-48EE-B70F-DA4BB32DB936}"/>
               </a:ext>
             </a:extLst>
           </p:cNvPr>
@@ -2964,7 +2965,7 @@
           <p:cNvPr id="6" name="슬라이드 번호 개체 틀 5">
             <a:extLst>
               <a:ext uri="{FF2B5EF4-FFF2-40B4-BE49-F238E27FC236}">
-                <a16:creationId xmlns:a16="http://schemas.microsoft.com/office/drawing/2014/main" id="{369D22CF-2FCC-4E71-B819-38A197FD2E6A}"/>
+                <a16:creationId xmlns:a16="http://schemas.microsoft.com/office/drawing/2014/main" xmlns="" id="{369D22CF-2FCC-4E71-B819-38A197FD2E6A}"/>
               </a:ext>
             </a:extLst>
           </p:cNvPr>
@@ -3332,7 +3333,7 @@
           <p:cNvPr id="14" name="그림 13">
             <a:extLst>
               <a:ext uri="{FF2B5EF4-FFF2-40B4-BE49-F238E27FC236}">
-                <a16:creationId xmlns:a16="http://schemas.microsoft.com/office/drawing/2014/main" id="{66563D31-B4BD-4F72-A3A9-C9B21539B624}"/>
+                <a16:creationId xmlns:a16="http://schemas.microsoft.com/office/drawing/2014/main" xmlns="" id="{66563D31-B4BD-4F72-A3A9-C9B21539B624}"/>
               </a:ext>
             </a:extLst>
           </p:cNvPr>
@@ -3392,7 +3393,7 @@
           <p:cNvPr id="4" name="그림 3">
             <a:extLst>
               <a:ext uri="{FF2B5EF4-FFF2-40B4-BE49-F238E27FC236}">
-                <a16:creationId xmlns:a16="http://schemas.microsoft.com/office/drawing/2014/main" id="{6B2FC2AA-175C-4ECB-963C-7B4032405F9B}"/>
+                <a16:creationId xmlns:a16="http://schemas.microsoft.com/office/drawing/2014/main" xmlns="" id="{6B2FC2AA-175C-4ECB-963C-7B4032405F9B}"/>
               </a:ext>
             </a:extLst>
           </p:cNvPr>
@@ -3422,7 +3423,7 @@
           <p:cNvPr id="9" name="직선 연결선 8">
             <a:extLst>
               <a:ext uri="{FF2B5EF4-FFF2-40B4-BE49-F238E27FC236}">
-                <a16:creationId xmlns:a16="http://schemas.microsoft.com/office/drawing/2014/main" id="{86468CFE-098F-4B2F-A21F-EBD48B9DC68B}"/>
+                <a16:creationId xmlns:a16="http://schemas.microsoft.com/office/drawing/2014/main" xmlns="" id="{86468CFE-098F-4B2F-A21F-EBD48B9DC68B}"/>
               </a:ext>
             </a:extLst>
           </p:cNvPr>
@@ -3466,7 +3467,7 @@
           <p:cNvPr id="12" name="직선 화살표 연결선 11">
             <a:extLst>
               <a:ext uri="{FF2B5EF4-FFF2-40B4-BE49-F238E27FC236}">
-                <a16:creationId xmlns:a16="http://schemas.microsoft.com/office/drawing/2014/main" id="{32DAF00B-549F-4DD6-B405-1DC1F5573951}"/>
+                <a16:creationId xmlns:a16="http://schemas.microsoft.com/office/drawing/2014/main" xmlns="" id="{32DAF00B-549F-4DD6-B405-1DC1F5573951}"/>
               </a:ext>
             </a:extLst>
           </p:cNvPr>
@@ -3509,7 +3510,7 @@
           <p:cNvPr id="13" name="직선 연결선 12">
             <a:extLst>
               <a:ext uri="{FF2B5EF4-FFF2-40B4-BE49-F238E27FC236}">
-                <a16:creationId xmlns:a16="http://schemas.microsoft.com/office/drawing/2014/main" id="{2008E422-A42F-448F-B3B4-E22238863EAF}"/>
+                <a16:creationId xmlns:a16="http://schemas.microsoft.com/office/drawing/2014/main" xmlns="" id="{2008E422-A42F-448F-B3B4-E22238863EAF}"/>
               </a:ext>
             </a:extLst>
           </p:cNvPr>
@@ -3553,7 +3554,7 @@
           <p:cNvPr id="15" name="직선 화살표 연결선 14">
             <a:extLst>
               <a:ext uri="{FF2B5EF4-FFF2-40B4-BE49-F238E27FC236}">
-                <a16:creationId xmlns:a16="http://schemas.microsoft.com/office/drawing/2014/main" id="{4D381734-2921-4EBD-B933-11BCEEEE76FC}"/>
+                <a16:creationId xmlns:a16="http://schemas.microsoft.com/office/drawing/2014/main" xmlns="" id="{4D381734-2921-4EBD-B933-11BCEEEE76FC}"/>
               </a:ext>
             </a:extLst>
           </p:cNvPr>
@@ -3600,7 +3601,7 @@
               <p:cNvPr id="17" name="TextBox 16">
                 <a:extLst>
                   <a:ext uri="{FF2B5EF4-FFF2-40B4-BE49-F238E27FC236}">
-                    <a16:creationId xmlns:a16="http://schemas.microsoft.com/office/drawing/2014/main" id="{C158CBCE-0E88-4904-B65A-60B19EE1810C}"/>
+                    <a16:creationId xmlns:a16="http://schemas.microsoft.com/office/drawing/2014/main" xmlns="" id="{C158CBCE-0E88-4904-B65A-60B19EE1810C}"/>
                   </a:ext>
                 </a:extLst>
               </p:cNvPr>
@@ -3700,7 +3701,7 @@
           <p:cNvPr id="18" name="타원 17">
             <a:extLst>
               <a:ext uri="{FF2B5EF4-FFF2-40B4-BE49-F238E27FC236}">
-                <a16:creationId xmlns:a16="http://schemas.microsoft.com/office/drawing/2014/main" id="{924F99D5-52C8-4693-AA77-629C03426D1D}"/>
+                <a16:creationId xmlns:a16="http://schemas.microsoft.com/office/drawing/2014/main" xmlns="" id="{924F99D5-52C8-4693-AA77-629C03426D1D}"/>
               </a:ext>
             </a:extLst>
           </p:cNvPr>
@@ -3753,7 +3754,7 @@
           <p:cNvPr id="20" name="직선 화살표 연결선 19">
             <a:extLst>
               <a:ext uri="{FF2B5EF4-FFF2-40B4-BE49-F238E27FC236}">
-                <a16:creationId xmlns:a16="http://schemas.microsoft.com/office/drawing/2014/main" id="{C816E78E-0FE3-4673-8356-DF506D4A190D}"/>
+                <a16:creationId xmlns:a16="http://schemas.microsoft.com/office/drawing/2014/main" xmlns="" id="{C816E78E-0FE3-4673-8356-DF506D4A190D}"/>
               </a:ext>
             </a:extLst>
           </p:cNvPr>
@@ -3796,7 +3797,7 @@
               <p:cNvPr id="21" name="TextBox 20">
                 <a:extLst>
                   <a:ext uri="{FF2B5EF4-FFF2-40B4-BE49-F238E27FC236}">
-                    <a16:creationId xmlns:a16="http://schemas.microsoft.com/office/drawing/2014/main" id="{7D17431A-CB7F-4820-9673-3418C4EBFB8A}"/>
+                    <a16:creationId xmlns:a16="http://schemas.microsoft.com/office/drawing/2014/main" xmlns="" id="{7D17431A-CB7F-4820-9673-3418C4EBFB8A}"/>
                   </a:ext>
                 </a:extLst>
               </p:cNvPr>
@@ -3839,7 +3840,7 @@
                         <m:endChr m:val="|"/>
                         <m:ctrlPr>
                           <a:rPr lang="en-US" altLang="ko-KR" b="0" i="1" smtClean="0">
-                            <a:latin typeface="Cambria Math" panose="02040503050406030204" pitchFamily="18" charset="0"/>
+                            <a:latin typeface="Cambria Math"/>
                           </a:rPr>
                         </m:ctrlPr>
                       </m:dPr>
@@ -3954,7 +3955,7 @@
               <p:cNvPr id="22" name="TextBox 21">
                 <a:extLst>
                   <a:ext uri="{FF2B5EF4-FFF2-40B4-BE49-F238E27FC236}">
-                    <a16:creationId xmlns:a16="http://schemas.microsoft.com/office/drawing/2014/main" id="{4A686D05-C050-40D5-B3AD-2B1B64A7D7A2}"/>
+                    <a16:creationId xmlns:a16="http://schemas.microsoft.com/office/drawing/2014/main" xmlns="" id="{4A686D05-C050-40D5-B3AD-2B1B64A7D7A2}"/>
                   </a:ext>
                 </a:extLst>
               </p:cNvPr>
@@ -3997,7 +3998,7 @@
                         <m:endChr m:val="|"/>
                         <m:ctrlPr>
                           <a:rPr lang="en-US" altLang="ko-KR" b="0" i="1" smtClean="0">
-                            <a:latin typeface="Cambria Math" panose="02040503050406030204" pitchFamily="18" charset="0"/>
+                            <a:latin typeface="Cambria Math"/>
                           </a:rPr>
                         </m:ctrlPr>
                       </m:dPr>
@@ -4115,6 +4116,322 @@
   <p:clrMapOvr>
     <a:masterClrMapping/>
   </p:clrMapOvr>
+  <p:timing>
+    <p:tnLst>
+      <p:par>
+        <p:cTn id="1" dur="indefinite" restart="never" nodeType="tmRoot"/>
+      </p:par>
+    </p:tnLst>
+  </p:timing>
+</p:sld>
+</file>
+
+<file path=ppt/slides/slide3.xml><?xml version="1.0" encoding="utf-8"?>
+<p:sld xmlns:a="http://schemas.openxmlformats.org/drawingml/2006/main" xmlns:r="http://schemas.openxmlformats.org/officeDocument/2006/relationships" xmlns:p="http://schemas.openxmlformats.org/presentationml/2006/main">
+  <p:cSld>
+    <p:spTree>
+      <p:nvGrpSpPr>
+        <p:cNvPr id="1" name=""/>
+        <p:cNvGrpSpPr/>
+        <p:nvPr/>
+      </p:nvGrpSpPr>
+      <p:grpSpPr>
+        <a:xfrm>
+          <a:off x="0" y="0"/>
+          <a:ext cx="0" cy="0"/>
+          <a:chOff x="0" y="0"/>
+          <a:chExt cx="0" cy="0"/>
+        </a:xfrm>
+      </p:grpSpPr>
+      <p:sp>
+        <p:nvSpPr>
+          <p:cNvPr id="5" name="TextBox 4"/>
+          <p:cNvSpPr txBox="1"/>
+          <p:nvPr/>
+        </p:nvSpPr>
+        <p:spPr>
+          <a:xfrm>
+            <a:off x="6632758" y="1465258"/>
+            <a:ext cx="2996718" cy="1754326"/>
+          </a:xfrm>
+          <a:prstGeom prst="rect">
+            <a:avLst/>
+          </a:prstGeom>
+          <a:noFill/>
+        </p:spPr>
+        <p:txBody>
+          <a:bodyPr wrap="none" rtlCol="0">
+            <a:spAutoFit/>
+          </a:bodyPr>
+          <a:lstStyle/>
+          <a:p>
+            <a:pPr algn="ctr"/>
+            <a:r>
+              <a:rPr lang="ko-KR" altLang="en-US" sz="5400" dirty="0" smtClean="0">
+                <a:latin typeface="스웨거 TTF" pitchFamily="50" charset="-127"/>
+                <a:ea typeface="스웨거 TTF" pitchFamily="50" charset="-127"/>
+              </a:rPr>
+              <a:t>추가 정보</a:t>
+            </a:r>
+            <a:endParaRPr lang="en-US" altLang="ko-KR" sz="5400" dirty="0" smtClean="0">
+              <a:latin typeface="스웨거 TTF" pitchFamily="50" charset="-127"/>
+              <a:ea typeface="스웨거 TTF" pitchFamily="50" charset="-127"/>
+            </a:endParaRPr>
+          </a:p>
+          <a:p>
+            <a:pPr algn="ctr"/>
+            <a:r>
+              <a:rPr lang="en-US" altLang="ko-KR" sz="5400" dirty="0" smtClean="0">
+                <a:latin typeface="스웨거 TTF" pitchFamily="50" charset="-127"/>
+                <a:ea typeface="스웨거 TTF" pitchFamily="50" charset="-127"/>
+              </a:rPr>
+              <a:t>(likelihood)</a:t>
+            </a:r>
+            <a:endParaRPr lang="ko-KR" altLang="en-US" sz="5400" dirty="0">
+              <a:latin typeface="스웨거 TTF" pitchFamily="50" charset="-127"/>
+              <a:ea typeface="스웨거 TTF" pitchFamily="50" charset="-127"/>
+            </a:endParaRPr>
+          </a:p>
+        </p:txBody>
+      </p:sp>
+      <p:sp>
+        <p:nvSpPr>
+          <p:cNvPr id="7" name="TextBox 6"/>
+          <p:cNvSpPr txBox="1"/>
+          <p:nvPr/>
+        </p:nvSpPr>
+        <p:spPr>
+          <a:xfrm>
+            <a:off x="2562524" y="1465258"/>
+            <a:ext cx="1880643" cy="1754326"/>
+          </a:xfrm>
+          <a:prstGeom prst="rect">
+            <a:avLst/>
+          </a:prstGeom>
+          <a:noFill/>
+        </p:spPr>
+        <p:txBody>
+          <a:bodyPr wrap="none" rtlCol="0">
+            <a:spAutoFit/>
+          </a:bodyPr>
+          <a:lstStyle/>
+          <a:p>
+            <a:pPr algn="ctr"/>
+            <a:r>
+              <a:rPr lang="ko-KR" altLang="en-US" sz="5400" dirty="0" smtClean="0">
+                <a:latin typeface="스웨거 TTF" pitchFamily="50" charset="-127"/>
+                <a:ea typeface="스웨거 TTF" pitchFamily="50" charset="-127"/>
+              </a:rPr>
+              <a:t>사전지</a:t>
+            </a:r>
+            <a:r>
+              <a:rPr lang="ko-KR" altLang="en-US" sz="5400" dirty="0">
+                <a:latin typeface="스웨거 TTF" pitchFamily="50" charset="-127"/>
+                <a:ea typeface="스웨거 TTF" pitchFamily="50" charset="-127"/>
+              </a:rPr>
+              <a:t>식</a:t>
+            </a:r>
+            <a:endParaRPr lang="en-US" altLang="ko-KR" sz="5400" dirty="0" smtClean="0">
+              <a:latin typeface="스웨거 TTF" pitchFamily="50" charset="-127"/>
+              <a:ea typeface="스웨거 TTF" pitchFamily="50" charset="-127"/>
+            </a:endParaRPr>
+          </a:p>
+          <a:p>
+            <a:pPr algn="ctr"/>
+            <a:r>
+              <a:rPr lang="en-US" altLang="ko-KR" sz="5400" dirty="0" smtClean="0">
+                <a:latin typeface="스웨거 TTF" pitchFamily="50" charset="-127"/>
+                <a:ea typeface="스웨거 TTF" pitchFamily="50" charset="-127"/>
+              </a:rPr>
+              <a:t>(prior)</a:t>
+            </a:r>
+            <a:endParaRPr lang="ko-KR" altLang="en-US" sz="5400" dirty="0">
+              <a:latin typeface="스웨거 TTF" pitchFamily="50" charset="-127"/>
+              <a:ea typeface="스웨거 TTF" pitchFamily="50" charset="-127"/>
+            </a:endParaRPr>
+          </a:p>
+        </p:txBody>
+      </p:sp>
+      <mc:AlternateContent xmlns:mc="http://schemas.openxmlformats.org/markup-compatibility/2006">
+        <mc:Choice xmlns:a14="http://schemas.microsoft.com/office/drawing/2010/main" Requires="a14">
+          <p:sp>
+            <p:nvSpPr>
+              <p:cNvPr id="8" name="TextBox 7"/>
+              <p:cNvSpPr txBox="1"/>
+              <p:nvPr/>
+            </p:nvSpPr>
+            <p:spPr>
+              <a:xfrm>
+                <a:off x="5126632" y="1880756"/>
+                <a:ext cx="822661" cy="923330"/>
+              </a:xfrm>
+              <a:prstGeom prst="rect">
+                <a:avLst/>
+              </a:prstGeom>
+              <a:noFill/>
+            </p:spPr>
+            <p:txBody>
+              <a:bodyPr wrap="none" rtlCol="0">
+                <a:spAutoFit/>
+              </a:bodyPr>
+              <a:lstStyle/>
+              <a:p>
+                <a:pPr algn="ctr"/>
+                <a14:m>
+                  <m:oMathPara xmlns:m="http://schemas.openxmlformats.org/officeDocument/2006/math">
+                    <m:oMathParaPr>
+                      <m:jc m:val="centerGroup"/>
+                    </m:oMathParaPr>
+                    <m:oMath xmlns:m="http://schemas.openxmlformats.org/officeDocument/2006/math">
+                      <m:r>
+                        <a:rPr lang="en-US" altLang="ko-KR" sz="5400" b="0" i="1" dirty="0" smtClean="0">
+                          <a:latin typeface="Cambria Math"/>
+                          <a:ea typeface="스웨거 TTF" pitchFamily="50" charset="-127"/>
+                        </a:rPr>
+                        <m:t>×</m:t>
+                      </m:r>
+                    </m:oMath>
+                  </m:oMathPara>
+                </a14:m>
+                <a:endParaRPr lang="ko-KR" altLang="en-US" sz="5400" dirty="0">
+                  <a:latin typeface="스웨거 TTF" pitchFamily="50" charset="-127"/>
+                  <a:ea typeface="스웨거 TTF" pitchFamily="50" charset="-127"/>
+                </a:endParaRPr>
+              </a:p>
+            </p:txBody>
+          </p:sp>
+        </mc:Choice>
+        <mc:Fallback>
+          <p:sp>
+            <p:nvSpPr>
+              <p:cNvPr id="8" name="TextBox 7"/>
+              <p:cNvSpPr txBox="1">
+                <a:spLocks noRot="1" noChangeAspect="1" noMove="1" noResize="1" noEditPoints="1" noAdjustHandles="1" noChangeArrowheads="1" noChangeShapeType="1" noTextEdit="1"/>
+              </p:cNvSpPr>
+              <p:nvPr/>
+            </p:nvSpPr>
+            <p:spPr>
+              <a:xfrm>
+                <a:off x="5126632" y="1880756"/>
+                <a:ext cx="822661" cy="923330"/>
+              </a:xfrm>
+              <a:prstGeom prst="rect">
+                <a:avLst/>
+              </a:prstGeom>
+              <a:blipFill rotWithShape="1">
+                <a:blip r:embed="rId2"/>
+                <a:stretch>
+                  <a:fillRect/>
+                </a:stretch>
+              </a:blipFill>
+            </p:spPr>
+            <p:txBody>
+              <a:bodyPr/>
+              <a:lstStyle/>
+              <a:p>
+                <a:r>
+                  <a:rPr lang="ko-KR" altLang="en-US">
+                    <a:noFill/>
+                  </a:rPr>
+                  <a:t> </a:t>
+                </a:r>
+              </a:p>
+            </p:txBody>
+          </p:sp>
+        </mc:Fallback>
+      </mc:AlternateContent>
+      <p:sp>
+        <p:nvSpPr>
+          <p:cNvPr id="10" name="아래쪽 화살표 9"/>
+          <p:cNvSpPr/>
+          <p:nvPr/>
+        </p:nvSpPr>
+        <p:spPr>
+          <a:xfrm>
+            <a:off x="5211238" y="3219584"/>
+            <a:ext cx="484632" cy="978408"/>
+          </a:xfrm>
+          <a:prstGeom prst="downArrow">
+            <a:avLst/>
+          </a:prstGeom>
+        </p:spPr>
+        <p:style>
+          <a:lnRef idx="3">
+            <a:schemeClr val="lt1"/>
+          </a:lnRef>
+          <a:fillRef idx="1">
+            <a:schemeClr val="accent2"/>
+          </a:fillRef>
+          <a:effectRef idx="1">
+            <a:schemeClr val="accent2"/>
+          </a:effectRef>
+          <a:fontRef idx="minor">
+            <a:schemeClr val="lt1"/>
+          </a:fontRef>
+        </p:style>
+        <p:txBody>
+          <a:bodyPr rtlCol="0" anchor="ctr"/>
+          <a:lstStyle/>
+          <a:p>
+            <a:pPr algn="ctr"/>
+            <a:endParaRPr lang="ko-KR" altLang="en-US"/>
+          </a:p>
+        </p:txBody>
+      </p:sp>
+      <p:sp>
+        <p:nvSpPr>
+          <p:cNvPr id="11" name="TextBox 10"/>
+          <p:cNvSpPr txBox="1"/>
+          <p:nvPr/>
+        </p:nvSpPr>
+        <p:spPr>
+          <a:xfrm>
+            <a:off x="4466744" y="4469413"/>
+            <a:ext cx="1973617" cy="923330"/>
+          </a:xfrm>
+          <a:prstGeom prst="rect">
+            <a:avLst/>
+          </a:prstGeom>
+          <a:noFill/>
+        </p:spPr>
+        <p:txBody>
+          <a:bodyPr wrap="none" rtlCol="0">
+            <a:spAutoFit/>
+          </a:bodyPr>
+          <a:lstStyle/>
+          <a:p>
+            <a:pPr algn="ctr"/>
+            <a:r>
+              <a:rPr lang="ko-KR" altLang="en-US" sz="5400" smtClean="0">
+                <a:latin typeface="스웨거 TTF" pitchFamily="50" charset="-127"/>
+                <a:ea typeface="스웨거 TTF" pitchFamily="50" charset="-127"/>
+              </a:rPr>
+              <a:t>판단 근거</a:t>
+            </a:r>
+            <a:endParaRPr lang="ko-KR" altLang="en-US" sz="5400" dirty="0">
+              <a:latin typeface="스웨거 TTF" pitchFamily="50" charset="-127"/>
+              <a:ea typeface="스웨거 TTF" pitchFamily="50" charset="-127"/>
+            </a:endParaRPr>
+          </a:p>
+        </p:txBody>
+      </p:sp>
+    </p:spTree>
+    <p:extLst>
+      <p:ext uri="{BB962C8B-B14F-4D97-AF65-F5344CB8AC3E}">
+        <p14:creationId xmlns:p14="http://schemas.microsoft.com/office/powerpoint/2010/main" val="3133041808"/>
+      </p:ext>
+    </p:extLst>
+  </p:cSld>
+  <p:clrMapOvr>
+    <a:masterClrMapping/>
+  </p:clrMapOvr>
+  <p:timing>
+    <p:tnLst>
+      <p:par>
+        <p:cTn id="1" dur="indefinite" restart="never" nodeType="tmRoot"/>
+      </p:par>
+    </p:tnLst>
+  </p:timing>
 </p:sld>
 </file>
 
@@ -4161,7 +4478,7 @@
     </a:clrScheme>
     <a:fontScheme name="Office">
       <a:majorFont>
-        <a:latin typeface="맑은 고딕" panose="020F0302020204030204"/>
+        <a:latin typeface="맑은 고딕"/>
         <a:ea typeface=""/>
         <a:cs typeface=""/>
         <a:font script="Jpan" typeface="游ゴシック Light"/>
@@ -4213,7 +4530,7 @@
         <a:font script="Tfng" typeface="Ebrima"/>
       </a:majorFont>
       <a:minorFont>
-        <a:latin typeface="맑은 고딕" panose="020F0502020204030204"/>
+        <a:latin typeface="맑은 고딕"/>
         <a:ea typeface=""/>
         <a:cs typeface=""/>
         <a:font script="Jpan" typeface="游ゴシック"/>
@@ -4407,7 +4724,7 @@
   <a:extraClrSchemeLst/>
   <a:extLst>
     <a:ext uri="{05A4C25C-085E-4340-85A3-A5531E510DB2}">
-      <thm15:themeFamily xmlns:thm15="http://schemas.microsoft.com/office/thememl/2012/main" name="Office Theme" id="{62F939B6-93AF-4DB8-9C6B-D6C7DFDC589F}" vid="{4A3C46E8-61CC-4603-A589-7422A47A8E4A}"/>
+      <thm15:themeFamily xmlns:thm15="http://schemas.microsoft.com/office/thememl/2012/main" xmlns="" name="Office Theme" id="{62F939B6-93AF-4DB8-9C6B-D6C7DFDC589F}" vid="{4A3C46E8-61CC-4603-A589-7422A47A8E4A}"/>
     </a:ext>
   </a:extLst>
 </a:theme>

</xml_diff>